<commit_message>
Add link of the Githubs project
</commit_message>
<xml_diff>
--- a/ebook.pptx
+++ b/ebook.pptx
@@ -3448,18 +3448,7 @@
                   </a:schemeClr>
                 </a:solidFill>
               </a:rPr>
-              <a:t>: o método mais comum e básico</a:t>
-            </a:r>
-            <a:r>
-              <a:rPr lang="pt-BR" sz="2400" dirty="0" smtClean="0">
-                <a:solidFill>
-                  <a:schemeClr val="accent5">
-                    <a:lumMod val="60000"/>
-                    <a:lumOff val="40000"/>
-                  </a:schemeClr>
-                </a:solidFill>
-              </a:rPr>
-              <a:t>.</a:t>
+              <a:t>: o método mais comum e básico.</a:t>
             </a:r>
             <a:br>
               <a:rPr lang="pt-BR" sz="2400" dirty="0" smtClean="0">
@@ -3556,18 +3545,7 @@
                   </a:schemeClr>
                 </a:solidFill>
               </a:rPr>
-              <a:t>, biometria, etc</a:t>
-            </a:r>
-            <a:r>
-              <a:rPr lang="pt-BR" sz="2400" dirty="0" smtClean="0">
-                <a:solidFill>
-                  <a:schemeClr val="accent5">
-                    <a:lumMod val="60000"/>
-                    <a:lumOff val="40000"/>
-                  </a:schemeClr>
-                </a:solidFill>
-              </a:rPr>
-              <a:t>.</a:t>
+              <a:t>, biometria, etc.</a:t>
             </a:r>
             <a:br>
               <a:rPr lang="pt-BR" sz="2400" dirty="0" smtClean="0">
@@ -3609,18 +3587,7 @@
                   </a:schemeClr>
                 </a:solidFill>
               </a:rPr>
-              <a:t>Autenticação </a:t>
-            </a:r>
-            <a:r>
-              <a:rPr lang="pt-BR" sz="2400" b="1" dirty="0" smtClean="0">
-                <a:solidFill>
-                  <a:schemeClr val="accent5">
-                    <a:lumMod val="60000"/>
-                    <a:lumOff val="40000"/>
-                  </a:schemeClr>
-                </a:solidFill>
-              </a:rPr>
-              <a:t>federada</a:t>
+              <a:t>Autenticação federada</a:t>
             </a:r>
             <a:r>
               <a:rPr lang="pt-BR" sz="2400" dirty="0" smtClean="0">
@@ -3675,18 +3642,7 @@
                   </a:schemeClr>
                 </a:solidFill>
               </a:rPr>
-              <a:t>, ou outros provedores de identidade</a:t>
-            </a:r>
-            <a:r>
-              <a:rPr lang="pt-BR" sz="2400" dirty="0" smtClean="0">
-                <a:solidFill>
-                  <a:schemeClr val="accent5">
-                    <a:lumMod val="60000"/>
-                    <a:lumOff val="40000"/>
-                  </a:schemeClr>
-                </a:solidFill>
-              </a:rPr>
-              <a:t>.</a:t>
+              <a:t>, ou outros provedores de identidade.</a:t>
             </a:r>
             <a:br>
               <a:rPr lang="pt-BR" sz="2400" dirty="0" smtClean="0">
@@ -3728,18 +3684,7 @@
                   </a:schemeClr>
                 </a:solidFill>
               </a:rPr>
-              <a:t>Chaves </a:t>
-            </a:r>
-            <a:r>
-              <a:rPr lang="pt-BR" sz="2400" b="1" dirty="0" smtClean="0">
-                <a:solidFill>
-                  <a:schemeClr val="accent5">
-                    <a:lumMod val="60000"/>
-                    <a:lumOff val="40000"/>
-                  </a:schemeClr>
-                </a:solidFill>
-              </a:rPr>
-              <a:t>de acesso (API Keys)</a:t>
+              <a:t>Chaves de acesso (API Keys)</a:t>
             </a:r>
             <a:r>
               <a:rPr lang="pt-BR" sz="2400" dirty="0" smtClean="0">
@@ -3962,18 +3907,7 @@
                   </a:schemeClr>
                 </a:solidFill>
               </a:rPr>
-              <a:t>: diferentes permissões para administradores, editores e leitores</a:t>
-            </a:r>
-            <a:r>
-              <a:rPr lang="pt-BR" sz="2400" dirty="0" smtClean="0">
-                <a:solidFill>
-                  <a:schemeClr val="accent5">
-                    <a:lumMod val="60000"/>
-                    <a:lumOff val="40000"/>
-                  </a:schemeClr>
-                </a:solidFill>
-              </a:rPr>
-              <a:t>.</a:t>
+              <a:t>: diferentes permissões para administradores, editores e leitores.</a:t>
             </a:r>
           </a:p>
           <a:p>
@@ -3996,18 +3930,7 @@
                   </a:schemeClr>
                 </a:solidFill>
               </a:rPr>
-              <a:t>Controle </a:t>
-            </a:r>
-            <a:r>
-              <a:rPr lang="pt-BR" sz="2400" b="1" dirty="0" smtClean="0">
-                <a:solidFill>
-                  <a:schemeClr val="accent5">
-                    <a:lumMod val="60000"/>
-                    <a:lumOff val="40000"/>
-                  </a:schemeClr>
-                </a:solidFill>
-              </a:rPr>
-              <a:t>de acesso baseado em atributos (ABAC)</a:t>
+              <a:t>Controle de acesso baseado em atributos (ABAC)</a:t>
             </a:r>
             <a:r>
               <a:rPr lang="pt-BR" sz="2400" dirty="0" smtClean="0">
@@ -4018,18 +3941,7 @@
                   </a:schemeClr>
                 </a:solidFill>
               </a:rPr>
-              <a:t>: permissões condicionadas a atributos como localização, horário ou dispositivo</a:t>
-            </a:r>
-            <a:r>
-              <a:rPr lang="pt-BR" sz="2400" dirty="0" smtClean="0">
-                <a:solidFill>
-                  <a:schemeClr val="accent5">
-                    <a:lumMod val="60000"/>
-                    <a:lumOff val="40000"/>
-                  </a:schemeClr>
-                </a:solidFill>
-              </a:rPr>
-              <a:t>.</a:t>
+              <a:t>: permissões condicionadas a atributos como localização, horário ou dispositivo.</a:t>
             </a:r>
           </a:p>
           <a:p>
@@ -4052,18 +3964,7 @@
                   </a:schemeClr>
                 </a:solidFill>
               </a:rPr>
-              <a:t>Políticas </a:t>
-            </a:r>
-            <a:r>
-              <a:rPr lang="pt-BR" sz="2400" b="1" dirty="0" smtClean="0">
-                <a:solidFill>
-                  <a:schemeClr val="accent5">
-                    <a:lumMod val="60000"/>
-                    <a:lumOff val="40000"/>
-                  </a:schemeClr>
-                </a:solidFill>
-              </a:rPr>
-              <a:t>personalizadas</a:t>
+              <a:t>Políticas personalizadas</a:t>
             </a:r>
             <a:r>
               <a:rPr lang="pt-BR" sz="2400" dirty="0" smtClean="0">
@@ -4074,18 +3975,7 @@
                   </a:schemeClr>
                 </a:solidFill>
               </a:rPr>
-              <a:t>: regras específicas para fluxos críticos de negócios</a:t>
-            </a:r>
-            <a:r>
-              <a:rPr lang="pt-BR" sz="2400" dirty="0" smtClean="0">
-                <a:solidFill>
-                  <a:schemeClr val="accent5">
-                    <a:lumMod val="60000"/>
-                    <a:lumOff val="40000"/>
-                  </a:schemeClr>
-                </a:solidFill>
-              </a:rPr>
-              <a:t>.</a:t>
+              <a:t>: regras específicas para fluxos críticos de negócios.</a:t>
             </a:r>
           </a:p>
           <a:p>
@@ -4108,18 +3998,7 @@
                   </a:schemeClr>
                 </a:solidFill>
               </a:rPr>
-              <a:t>Autorização </a:t>
-            </a:r>
-            <a:r>
-              <a:rPr lang="pt-BR" sz="2400" b="1" dirty="0" smtClean="0">
-                <a:solidFill>
-                  <a:schemeClr val="accent5">
-                    <a:lumMod val="60000"/>
-                    <a:lumOff val="40000"/>
-                  </a:schemeClr>
-                </a:solidFill>
-              </a:rPr>
-              <a:t>em </a:t>
+              <a:t>Autorização em </a:t>
             </a:r>
             <a:r>
               <a:rPr lang="pt-BR" sz="2400" b="1" dirty="0" err="1" smtClean="0">
@@ -4511,6 +4390,62 @@
           <a:noFill/>
         </p:spPr>
       </p:pic>
+      <p:sp>
+        <p:nvSpPr>
+          <p:cNvPr id="12" name="CaixaDeTexto 11"/>
+          <p:cNvSpPr txBox="1"/>
+          <p:nvPr/>
+        </p:nvSpPr>
+        <p:spPr>
+          <a:xfrm>
+            <a:off x="1127825" y="5500694"/>
+            <a:ext cx="4602350" cy="369332"/>
+          </a:xfrm>
+          <a:prstGeom prst="rect">
+            <a:avLst/>
+          </a:prstGeom>
+          <a:noFill/>
+        </p:spPr>
+        <p:txBody>
+          <a:bodyPr wrap="none" rtlCol="0">
+            <a:spAutoFit/>
+          </a:bodyPr>
+          <a:lstStyle/>
+          <a:p>
+            <a:r>
+              <a:rPr lang="pt-BR" dirty="0" smtClean="0">
+                <a:solidFill>
+                  <a:schemeClr val="accent5">
+                    <a:lumMod val="60000"/>
+                    <a:lumOff val="40000"/>
+                  </a:schemeClr>
+                </a:solidFill>
+              </a:rPr>
+              <a:t>https://</a:t>
+            </a:r>
+            <a:r>
+              <a:rPr lang="pt-BR" dirty="0" smtClean="0">
+                <a:solidFill>
+                  <a:schemeClr val="accent5">
+                    <a:lumMod val="60000"/>
+                    <a:lumOff val="40000"/>
+                  </a:schemeClr>
+                </a:solidFill>
+                <a:hlinkClick r:id="rId5"/>
+              </a:rPr>
+              <a:t>github.com/arcnrick/prompts-ia-course</a:t>
+            </a:r>
+            <a:endParaRPr lang="pt-BR" dirty="0">
+              <a:solidFill>
+                <a:schemeClr val="accent5">
+                  <a:lumMod val="60000"/>
+                  <a:lumOff val="40000"/>
+                </a:schemeClr>
+              </a:solidFill>
+            </a:endParaRPr>
+          </a:p>
+        </p:txBody>
+      </p:sp>
     </p:spTree>
   </p:cSld>
   <p:clrMapOvr>
@@ -4571,11 +4506,7 @@
           <a:p>
             <a:r>
               <a:rPr lang="pt-BR" sz="2800" b="1" dirty="0" smtClean="0"/>
-              <a:t>Autenticação e </a:t>
-            </a:r>
-            <a:r>
-              <a:rPr lang="pt-BR" sz="2800" b="1" dirty="0" smtClean="0"/>
-              <a:t>Autorização</a:t>
+              <a:t>Autenticação e Autorização</a:t>
             </a:r>
             <a:endParaRPr lang="pt-BR" sz="2800" b="1" dirty="0"/>
           </a:p>
@@ -4605,23 +4536,7 @@
           <a:p>
             <a:r>
               <a:rPr lang="pt-BR" dirty="0" smtClean="0"/>
-              <a:t>Autenticação e </a:t>
-            </a:r>
-            <a:r>
-              <a:rPr lang="pt-BR" dirty="0" smtClean="0"/>
-              <a:t>Autorização </a:t>
-            </a:r>
-            <a:r>
-              <a:rPr lang="pt-BR" dirty="0" smtClean="0"/>
-              <a:t>são os pilares fundamentais de qualquer sistema de segurança em softwares. </a:t>
-            </a:r>
-            <a:r>
-              <a:rPr lang="pt-BR" dirty="0" smtClean="0"/>
-              <a:t>Essas </a:t>
-            </a:r>
-            <a:r>
-              <a:rPr lang="pt-BR" dirty="0" smtClean="0"/>
-              <a:t>etapas são essenciais para proteger dados sensíveis, preservar a integridade de sistemas e evitar brechas de segurança que podem levar a ataques devastadores. Com a crescente adoção de arquiteturas complexas, como </a:t>
+              <a:t>Autenticação e Autorização são os pilares fundamentais de qualquer sistema de segurança em softwares. Essas etapas são essenciais para proteger dados sensíveis, preservar a integridade de sistemas e evitar brechas de segurança que podem levar a ataques devastadores. Com a crescente adoção de arquiteturas complexas, como </a:t>
             </a:r>
             <a:r>
               <a:rPr lang="pt-BR" dirty="0" err="1" smtClean="0"/>
@@ -4651,11 +4566,7 @@
             </a:r>
             <a:r>
               <a:rPr lang="pt-BR" dirty="0" smtClean="0"/>
-              <a:t>, você será guiado através dos fundamentos e desafios da autenticação e autorização, explorando ferramentas, padrões e melhores práticas que capacitam desenvolvedores a criar sistemas mais seguros e confiáveis</a:t>
-            </a:r>
-            <a:r>
-              <a:rPr lang="pt-BR" dirty="0" smtClean="0"/>
-              <a:t>.</a:t>
+              <a:t>, você será guiado através dos fundamentos e desafios da autenticação e autorização, explorando ferramentas, padrões e melhores práticas que capacitam desenvolvedores a criar sistemas mais seguros e confiáveis.</a:t>
             </a:r>
             <a:endParaRPr lang="pt-BR" dirty="0"/>
           </a:p>
@@ -4894,18 +4805,7 @@
                   </a:schemeClr>
                 </a:solidFill>
               </a:rPr>
-              <a:t>: processo de validação da identidade do usuário</a:t>
-            </a:r>
-            <a:r>
-              <a:rPr lang="pt-BR" sz="2400" dirty="0" smtClean="0">
-                <a:solidFill>
-                  <a:schemeClr val="accent5">
-                    <a:lumMod val="60000"/>
-                    <a:lumOff val="40000"/>
-                  </a:schemeClr>
-                </a:solidFill>
-              </a:rPr>
-              <a:t>.</a:t>
+              <a:t>: processo de validação da identidade do usuário.</a:t>
             </a:r>
             <a:br>
               <a:rPr lang="pt-BR" sz="2400" dirty="0" smtClean="0">
@@ -4958,18 +4858,7 @@
                   </a:schemeClr>
                 </a:solidFill>
               </a:rPr>
-              <a:t>: processo de verificação de permissões para realizar ações específicas</a:t>
-            </a:r>
-            <a:r>
-              <a:rPr lang="pt-BR" sz="2400" dirty="0" smtClean="0">
-                <a:solidFill>
-                  <a:schemeClr val="accent5">
-                    <a:lumMod val="60000"/>
-                    <a:lumOff val="40000"/>
-                  </a:schemeClr>
-                </a:solidFill>
-              </a:rPr>
-              <a:t>.</a:t>
+              <a:t>: processo de verificação de permissões para realizar ações específicas.</a:t>
             </a:r>
             <a:br>
               <a:rPr lang="pt-BR" sz="2400" dirty="0" smtClean="0">
@@ -5011,18 +4900,7 @@
                   </a:schemeClr>
                 </a:solidFill>
               </a:rPr>
-              <a:t>Ambas são extremamente importantes nas etapas </a:t>
-            </a:r>
-            <a:r>
-              <a:rPr lang="pt-BR" sz="2400" dirty="0" smtClean="0">
-                <a:solidFill>
-                  <a:schemeClr val="accent5">
-                    <a:lumMod val="60000"/>
-                    <a:lumOff val="40000"/>
-                  </a:schemeClr>
-                </a:solidFill>
-              </a:rPr>
-              <a:t>na segurança de softwares.</a:t>
+              <a:t>Ambas são extremamente importantes nas etapas na segurança de softwares.</a:t>
             </a:r>
             <a:endParaRPr lang="pt-BR" sz="2400" dirty="0">
               <a:solidFill>
@@ -5242,40 +5120,7 @@
                   </a:schemeClr>
                 </a:solidFill>
               </a:rPr>
-              <a:t>: </a:t>
-            </a:r>
-            <a:r>
-              <a:rPr lang="pt-BR" sz="2400" dirty="0" smtClean="0">
-                <a:solidFill>
-                  <a:schemeClr val="accent5">
-                    <a:lumMod val="60000"/>
-                    <a:lumOff val="40000"/>
-                  </a:schemeClr>
-                </a:solidFill>
-              </a:rPr>
-              <a:t>garantir </a:t>
-            </a:r>
-            <a:r>
-              <a:rPr lang="pt-BR" sz="2400" dirty="0" smtClean="0">
-                <a:solidFill>
-                  <a:schemeClr val="accent5">
-                    <a:lumMod val="60000"/>
-                    <a:lumOff val="40000"/>
-                  </a:schemeClr>
-                </a:solidFill>
-              </a:rPr>
-              <a:t>que apenas usuários legítimos acessem o sistema</a:t>
-            </a:r>
-            <a:r>
-              <a:rPr lang="pt-BR" sz="2400" dirty="0" smtClean="0">
-                <a:solidFill>
-                  <a:schemeClr val="accent5">
-                    <a:lumMod val="60000"/>
-                    <a:lumOff val="40000"/>
-                  </a:schemeClr>
-                </a:solidFill>
-              </a:rPr>
-              <a:t>.</a:t>
+              <a:t>: garantir que apenas usuários legítimos acessem o sistema.</a:t>
             </a:r>
             <a:br>
               <a:rPr lang="pt-BR" sz="2400" dirty="0" smtClean="0">
@@ -5328,40 +5173,7 @@
                   </a:schemeClr>
                 </a:solidFill>
               </a:rPr>
-              <a:t>: </a:t>
-            </a:r>
-            <a:r>
-              <a:rPr lang="pt-BR" sz="2400" dirty="0" smtClean="0">
-                <a:solidFill>
-                  <a:schemeClr val="accent5">
-                    <a:lumMod val="60000"/>
-                    <a:lumOff val="40000"/>
-                  </a:schemeClr>
-                </a:solidFill>
-              </a:rPr>
-              <a:t>restringir </a:t>
-            </a:r>
-            <a:r>
-              <a:rPr lang="pt-BR" sz="2400" dirty="0" smtClean="0">
-                <a:solidFill>
-                  <a:schemeClr val="accent5">
-                    <a:lumMod val="60000"/>
-                    <a:lumOff val="40000"/>
-                  </a:schemeClr>
-                </a:solidFill>
-              </a:rPr>
-              <a:t>e controlar o acesso a recursos sensíveis com base em políticas </a:t>
-            </a:r>
-            <a:r>
-              <a:rPr lang="pt-BR" sz="2400" dirty="0" smtClean="0">
-                <a:solidFill>
-                  <a:schemeClr val="accent5">
-                    <a:lumMod val="60000"/>
-                    <a:lumOff val="40000"/>
-                  </a:schemeClr>
-                </a:solidFill>
-              </a:rPr>
-              <a:t>definidas.</a:t>
+              <a:t>: restringir e controlar o acesso a recursos sensíveis com base em políticas definidas.</a:t>
             </a:r>
             <a:br>
               <a:rPr lang="pt-BR" sz="2400" dirty="0" smtClean="0">
@@ -5507,29 +5319,7 @@
                   </a:schemeClr>
                 </a:solidFill>
               </a:rPr>
-              <a:t>Diferenças entre Autenticação </a:t>
-            </a:r>
-            <a:r>
-              <a:rPr lang="pt-BR" sz="4600" b="1" dirty="0" smtClean="0">
-                <a:solidFill>
-                  <a:schemeClr val="accent5">
-                    <a:lumMod val="40000"/>
-                    <a:lumOff val="60000"/>
-                  </a:schemeClr>
-                </a:solidFill>
-              </a:rPr>
-              <a:t>e </a:t>
-            </a:r>
-            <a:r>
-              <a:rPr lang="pt-BR" sz="4600" b="1" dirty="0" smtClean="0">
-                <a:solidFill>
-                  <a:schemeClr val="accent5">
-                    <a:lumMod val="40000"/>
-                    <a:lumOff val="60000"/>
-                  </a:schemeClr>
-                </a:solidFill>
-              </a:rPr>
-              <a:t>Autorização</a:t>
+              <a:t>Diferenças entre Autenticação e Autorização</a:t>
             </a:r>
             <a:endParaRPr lang="pt-BR" sz="4600" b="1" dirty="0">
               <a:solidFill>
@@ -5634,18 +5424,7 @@
                   </a:schemeClr>
                 </a:solidFill>
               </a:rPr>
-              <a:t>Autenticação </a:t>
-            </a:r>
-            <a:r>
-              <a:rPr lang="pt-BR" sz="2400" dirty="0" smtClean="0">
-                <a:solidFill>
-                  <a:schemeClr val="accent5">
-                    <a:lumMod val="60000"/>
-                    <a:lumOff val="40000"/>
-                  </a:schemeClr>
-                </a:solidFill>
-              </a:rPr>
-              <a:t>é sobre </a:t>
+              <a:t>Autenticação é sobre </a:t>
             </a:r>
             <a:r>
               <a:rPr lang="pt-BR" sz="2400" i="1" dirty="0" smtClean="0">

</xml_diff>